<commit_message>
An update of the car ontology
</commit_message>
<xml_diff>
--- a/docs/how-to-configure/car.pptx
+++ b/docs/how-to-configure/car.pptx
@@ -4,9 +4,12 @@
   <p:sldMasterIdLst>
     <p:sldMasterId id="2147483648" r:id="rId1"/>
   </p:sldMasterIdLst>
+  <p:notesMasterIdLst>
+    <p:notesMasterId r:id="rId6"/>
+  </p:notesMasterIdLst>
   <p:sldIdLst>
-    <p:sldId id="256" r:id="rId3"/>
-    <p:sldId id="257" r:id="rId4"/>
+    <p:sldId id="256" r:id="rId4"/>
+    <p:sldId id="257" r:id="rId5"/>
   </p:sldIdLst>
   <p:sldSz cx="12192000" cy="6858000"/>
   <p:notesSz cx="12192000" cy="6858000"/>
@@ -231,6 +234,490 @@
     </a:lvl9pPr>
   </p:defaultTextStyle>
 </p:presentation>
+</file>
+
+<file path=ppt/notesMasters/notesMaster1.xml><?xml version="1.0" encoding="utf-8"?>
+<p:notesMaster xmlns:a="http://schemas.openxmlformats.org/drawingml/2006/main" xmlns:r="http://schemas.openxmlformats.org/officeDocument/2006/relationships" xmlns:p="http://schemas.openxmlformats.org/presentationml/2006/main">
+  <p:cSld name="">
+    <p:bg>
+      <p:bgRef idx="1001">
+        <a:schemeClr val="bg1"/>
+      </p:bgRef>
+    </p:bg>
+    <p:spTree>
+      <p:nvGrpSpPr>
+        <p:cNvPr id="1" name=""/>
+        <p:cNvGrpSpPr/>
+        <p:nvPr/>
+      </p:nvGrpSpPr>
+      <p:grpSpPr bwMode="auto">
+        <a:xfrm>
+          <a:off x="0" y="0"/>
+          <a:ext cx="0" cy="0"/>
+          <a:chOff x="0" y="0"/>
+          <a:chExt cx="0" cy="0"/>
+        </a:xfrm>
+      </p:grpSpPr>
+      <p:sp>
+        <p:nvSpPr>
+          <p:cNvPr id="2" name="Header Placeholder 1"/>
+          <p:cNvSpPr>
+            <a:spLocks noGrp="1"/>
+          </p:cNvSpPr>
+          <p:nvPr>
+            <p:ph type="hdr" sz="quarter"/>
+          </p:nvPr>
+        </p:nvSpPr>
+        <p:spPr bwMode="auto">
+          <a:xfrm>
+            <a:off x="0" y="0"/>
+            <a:ext cx="2971800" cy="458788"/>
+          </a:xfrm>
+          <a:prstGeom prst="rect">
+            <a:avLst/>
+          </a:prstGeom>
+        </p:spPr>
+        <p:txBody>
+          <a:bodyPr vert="horz" lIns="91440" tIns="45720" rIns="91440" bIns="45720" rtlCol="0" anchor="ctr"/>
+          <a:lstStyle>
+            <a:lvl1pPr algn="l">
+              <a:defRPr sz="1200"/>
+            </a:lvl1pPr>
+          </a:lstStyle>
+          <a:p>
+            <a:pPr>
+              <a:defRPr/>
+            </a:pPr>
+            <a:endParaRPr/>
+          </a:p>
+        </p:txBody>
+      </p:sp>
+      <p:sp>
+        <p:nvSpPr>
+          <p:cNvPr id="3" name="Date Placeholder 2"/>
+          <p:cNvSpPr>
+            <a:spLocks noGrp="1"/>
+          </p:cNvSpPr>
+          <p:nvPr>
+            <p:ph type="dt" idx="2"/>
+          </p:nvPr>
+        </p:nvSpPr>
+        <p:spPr bwMode="auto">
+          <a:xfrm>
+            <a:off x="3884613" y="0"/>
+            <a:ext cx="2971800" cy="458788"/>
+          </a:xfrm>
+          <a:prstGeom prst="rect">
+            <a:avLst/>
+          </a:prstGeom>
+        </p:spPr>
+        <p:txBody>
+          <a:bodyPr vert="horz" lIns="91440" tIns="45720" rIns="91440" bIns="45720" rtlCol="0" anchor="ctr"/>
+          <a:lstStyle>
+            <a:lvl1pPr algn="r">
+              <a:defRPr sz="1200"/>
+            </a:lvl1pPr>
+          </a:lstStyle>
+          <a:p>
+            <a:pPr>
+              <a:defRPr/>
+            </a:pPr>
+            <a:endParaRPr/>
+          </a:p>
+        </p:txBody>
+      </p:sp>
+      <p:sp>
+        <p:nvSpPr>
+          <p:cNvPr id="3" name="Date Placeholder 2"/>
+          <p:cNvSpPr>
+            <a:spLocks noGrp="1"/>
+          </p:cNvSpPr>
+          <p:nvPr>
+            <p:ph type="dt" idx="3"/>
+          </p:nvPr>
+        </p:nvSpPr>
+        <p:spPr bwMode="auto">
+          <a:xfrm>
+            <a:off x="3884613" y="0"/>
+            <a:ext cx="2971800" cy="458788"/>
+          </a:xfrm>
+          <a:prstGeom prst="rect">
+            <a:avLst/>
+          </a:prstGeom>
+        </p:spPr>
+        <p:txBody>
+          <a:bodyPr vert="horz" lIns="91440" tIns="45720" rIns="91440" bIns="45720" rtlCol="0" anchor="ctr"/>
+          <a:lstStyle>
+            <a:lvl1pPr algn="r">
+              <a:defRPr sz="1200"/>
+            </a:lvl1pPr>
+          </a:lstStyle>
+          <a:p>
+            <a:pPr>
+              <a:defRPr/>
+            </a:pPr>
+            <a:endParaRPr/>
+          </a:p>
+        </p:txBody>
+      </p:sp>
+      <p:sp>
+        <p:nvSpPr>
+          <p:cNvPr id="5" name="Notes Placeholder 4"/>
+          <p:cNvSpPr>
+            <a:spLocks noGrp="1"/>
+          </p:cNvSpPr>
+          <p:nvPr>
+            <p:ph type="body" sz="quarter" idx="1"/>
+          </p:nvPr>
+        </p:nvSpPr>
+        <p:spPr bwMode="auto">
+          <a:xfrm>
+            <a:off x="685800" y="4400550"/>
+            <a:ext cx="5486400" cy="3600450"/>
+          </a:xfrm>
+          <a:prstGeom prst="rect">
+            <a:avLst/>
+          </a:prstGeom>
+        </p:spPr>
+        <p:txBody>
+          <a:bodyPr vert="horz" lIns="91440" tIns="45720" rIns="91440" bIns="45720" rtlCol="0" anchor="ctr"/>
+          <a:lstStyle/>
+          <a:p>
+            <a:pPr>
+              <a:defRPr/>
+            </a:pPr>
+            <a:endParaRPr/>
+          </a:p>
+        </p:txBody>
+      </p:sp>
+      <p:sp>
+        <p:nvSpPr>
+          <p:cNvPr id="6" name="Footer Placeholder 5"/>
+          <p:cNvSpPr>
+            <a:spLocks noGrp="1"/>
+          </p:cNvSpPr>
+          <p:nvPr>
+            <p:ph type="ftr" sz="quarter" idx="4"/>
+          </p:nvPr>
+        </p:nvSpPr>
+        <p:spPr bwMode="auto">
+          <a:xfrm>
+            <a:off x="0" y="8685213"/>
+            <a:ext cx="2971800" cy="458787"/>
+          </a:xfrm>
+          <a:prstGeom prst="rect">
+            <a:avLst/>
+          </a:prstGeom>
+        </p:spPr>
+        <p:txBody>
+          <a:bodyPr vert="horz" lIns="91440" tIns="45720" rIns="91440" bIns="45720" rtlCol="0" anchor="b"/>
+          <a:lstStyle>
+            <a:lvl1pPr algn="l">
+              <a:defRPr sz="1200"/>
+            </a:lvl1pPr>
+          </a:lstStyle>
+          <a:p>
+            <a:pPr>
+              <a:defRPr/>
+            </a:pPr>
+            <a:endParaRPr/>
+          </a:p>
+        </p:txBody>
+      </p:sp>
+      <p:sp>
+        <p:nvSpPr>
+          <p:cNvPr id="7" name="Slide Number Placeholder 6"/>
+          <p:cNvSpPr>
+            <a:spLocks noGrp="1"/>
+          </p:cNvSpPr>
+          <p:nvPr>
+            <p:ph type="sldNum" sz="quarter" idx="10"/>
+          </p:nvPr>
+        </p:nvSpPr>
+        <p:spPr bwMode="auto">
+          <a:xfrm>
+            <a:off x="3884613" y="8685213"/>
+            <a:ext cx="2971800" cy="458787"/>
+          </a:xfrm>
+          <a:prstGeom prst="rect">
+            <a:avLst/>
+          </a:prstGeom>
+        </p:spPr>
+        <p:txBody>
+          <a:bodyPr vert="horz" lIns="91440" tIns="45720" rIns="91440" bIns="45720" rtlCol="0" anchor="b"/>
+          <a:lstStyle>
+            <a:lvl1pPr algn="r">
+              <a:defRPr sz="1200"/>
+            </a:lvl1pPr>
+          </a:lstStyle>
+          <a:p>
+            <a:pPr>
+              <a:defRPr/>
+            </a:pPr>
+            <a:endParaRPr/>
+          </a:p>
+        </p:txBody>
+      </p:sp>
+    </p:spTree>
+  </p:cSld>
+  <p:clrMap bg1="lt1" tx1="dk1" bg2="lt2" tx2="dk2" accent1="accent1" accent2="accent2" accent3="accent3" accent4="accent4" accent5="accent5" accent6="accent6" hlink="hlink" folHlink="folHlink"/>
+  <p:notesStyle>
+    <a:lvl1pPr marL="0" algn="l" defTabSz="914400">
+      <a:defRPr sz="1200">
+        <a:solidFill>
+          <a:schemeClr val="tx1"/>
+        </a:solidFill>
+        <a:latin typeface="+mn-lt"/>
+        <a:ea typeface="+mn-ea"/>
+        <a:cs typeface="+mn-cs"/>
+      </a:defRPr>
+    </a:lvl1pPr>
+    <a:lvl2pPr marL="457200" algn="l" defTabSz="914400">
+      <a:defRPr sz="1200">
+        <a:solidFill>
+          <a:schemeClr val="tx1"/>
+        </a:solidFill>
+        <a:latin typeface="+mn-lt"/>
+        <a:ea typeface="+mn-ea"/>
+        <a:cs typeface="+mn-cs"/>
+      </a:defRPr>
+    </a:lvl2pPr>
+    <a:lvl3pPr marL="914400" algn="l" defTabSz="914400">
+      <a:defRPr sz="1200">
+        <a:solidFill>
+          <a:schemeClr val="tx1"/>
+        </a:solidFill>
+        <a:latin typeface="+mn-lt"/>
+        <a:ea typeface="+mn-ea"/>
+        <a:cs typeface="+mn-cs"/>
+      </a:defRPr>
+    </a:lvl3pPr>
+    <a:lvl4pPr marL="1371600" algn="l" defTabSz="914400">
+      <a:defRPr sz="1200">
+        <a:solidFill>
+          <a:schemeClr val="tx1"/>
+        </a:solidFill>
+        <a:latin typeface="+mn-lt"/>
+        <a:ea typeface="+mn-ea"/>
+        <a:cs typeface="+mn-cs"/>
+      </a:defRPr>
+    </a:lvl4pPr>
+    <a:lvl5pPr marL="1828800" algn="l" defTabSz="914400">
+      <a:defRPr sz="1200">
+        <a:solidFill>
+          <a:schemeClr val="tx1"/>
+        </a:solidFill>
+        <a:latin typeface="+mn-lt"/>
+        <a:ea typeface="+mn-ea"/>
+        <a:cs typeface="+mn-cs"/>
+      </a:defRPr>
+    </a:lvl5pPr>
+    <a:lvl6pPr marL="2286000" algn="l" defTabSz="914400">
+      <a:defRPr sz="1200">
+        <a:solidFill>
+          <a:schemeClr val="tx1"/>
+        </a:solidFill>
+        <a:latin typeface="+mn-lt"/>
+        <a:ea typeface="+mn-ea"/>
+        <a:cs typeface="+mn-cs"/>
+      </a:defRPr>
+    </a:lvl6pPr>
+    <a:lvl7pPr marL="2743200" algn="l" defTabSz="914400">
+      <a:defRPr sz="1200">
+        <a:solidFill>
+          <a:schemeClr val="tx1"/>
+        </a:solidFill>
+        <a:latin typeface="+mn-lt"/>
+        <a:ea typeface="+mn-ea"/>
+        <a:cs typeface="+mn-cs"/>
+      </a:defRPr>
+    </a:lvl7pPr>
+    <a:lvl8pPr marL="3200400" algn="l" defTabSz="914400">
+      <a:defRPr sz="1200">
+        <a:solidFill>
+          <a:schemeClr val="tx1"/>
+        </a:solidFill>
+        <a:latin typeface="+mn-lt"/>
+        <a:ea typeface="+mn-ea"/>
+        <a:cs typeface="+mn-cs"/>
+      </a:defRPr>
+    </a:lvl8pPr>
+    <a:lvl9pPr marL="3657600" algn="l" defTabSz="914400">
+      <a:defRPr sz="1200">
+        <a:solidFill>
+          <a:schemeClr val="tx1"/>
+        </a:solidFill>
+        <a:latin typeface="+mn-lt"/>
+        <a:ea typeface="+mn-ea"/>
+        <a:cs typeface="+mn-cs"/>
+      </a:defRPr>
+    </a:lvl9pPr>
+  </p:notesStyle>
+</p:notesMaster>
+</file>
+
+<file path=ppt/notesSlides/notesSlide1.xml><?xml version="1.0" encoding="utf-8"?>
+<p:notes xmlns:a="http://schemas.openxmlformats.org/drawingml/2006/main" xmlns:r="http://schemas.openxmlformats.org/officeDocument/2006/relationships" xmlns:p="http://schemas.openxmlformats.org/presentationml/2006/main" xmlns:m="http://schemas.openxmlformats.org/officeDocument/2006/math" xmlns:w="http://schemas.openxmlformats.org/wordprocessingml/2006/main">
+  <p:cSld name="">
+    <p:spTree>
+      <p:nvGrpSpPr>
+        <p:cNvPr id="1" name=""/>
+        <p:cNvGrpSpPr/>
+        <p:nvPr/>
+      </p:nvGrpSpPr>
+      <p:grpSpPr bwMode="auto">
+        <a:xfrm>
+          <a:off x="0" y="0"/>
+          <a:ext cx="0" cy="0"/>
+          <a:chOff x="0" y="0"/>
+          <a:chExt cx="0" cy="0"/>
+        </a:xfrm>
+      </p:grpSpPr>
+      <p:sp>
+        <p:nvSpPr>
+          <p:cNvPr id="2" name="Slide Image Placeholder 1"/>
+          <p:cNvSpPr>
+            <a:spLocks noChangeAspect="1" noGrp="1" noRot="1"/>
+          </p:cNvSpPr>
+          <p:nvPr>
+            <p:ph type="sldImg"/>
+          </p:nvPr>
+        </p:nvSpPr>
+        <p:spPr bwMode="auto"/>
+      </p:sp>
+      <p:sp>
+        <p:nvSpPr>
+          <p:cNvPr id="3" name="Notes Placeholder 2"/>
+          <p:cNvSpPr>
+            <a:spLocks noGrp="1"/>
+          </p:cNvSpPr>
+          <p:nvPr>
+            <p:ph type="body" idx="1"/>
+          </p:nvPr>
+        </p:nvSpPr>
+        <p:spPr bwMode="auto"/>
+        <p:txBody>
+          <a:bodyPr/>
+          <a:lstStyle/>
+          <a:p>
+            <a:pPr>
+              <a:defRPr/>
+            </a:pPr>
+            <a:endParaRPr/>
+          </a:p>
+        </p:txBody>
+      </p:sp>
+      <p:sp>
+        <p:nvSpPr>
+          <p:cNvPr id="4" name="Slide Number Placeholder 3"/>
+          <p:cNvSpPr>
+            <a:spLocks noGrp="1"/>
+          </p:cNvSpPr>
+          <p:nvPr>
+            <p:ph type="sldNum" sz="quarter" idx="10"/>
+          </p:nvPr>
+        </p:nvSpPr>
+        <p:spPr bwMode="auto"/>
+        <p:txBody>
+          <a:bodyPr/>
+          <a:lstStyle/>
+          <a:p>
+            <a:pPr>
+              <a:defRPr/>
+            </a:pPr>
+            <a:fld id="{E5255864-BB07-42D4-B146-DE3DE41EE6CD}" type="slidenum">
+              <a:rPr/>
+              <a:t/>
+            </a:fld>
+            <a:endParaRPr/>
+          </a:p>
+        </p:txBody>
+      </p:sp>
+    </p:spTree>
+  </p:cSld>
+</p:notes>
+</file>
+
+<file path=ppt/notesSlides/notesSlide2.xml><?xml version="1.0" encoding="utf-8"?>
+<p:notes xmlns:a="http://schemas.openxmlformats.org/drawingml/2006/main" xmlns:r="http://schemas.openxmlformats.org/officeDocument/2006/relationships" xmlns:p="http://schemas.openxmlformats.org/presentationml/2006/main" xmlns:m="http://schemas.openxmlformats.org/officeDocument/2006/math" xmlns:w="http://schemas.openxmlformats.org/wordprocessingml/2006/main">
+  <p:cSld name="">
+    <p:spTree>
+      <p:nvGrpSpPr>
+        <p:cNvPr id="1" name=""/>
+        <p:cNvGrpSpPr/>
+        <p:nvPr/>
+      </p:nvGrpSpPr>
+      <p:grpSpPr bwMode="auto">
+        <a:xfrm>
+          <a:off x="0" y="0"/>
+          <a:ext cx="0" cy="0"/>
+          <a:chOff x="0" y="0"/>
+          <a:chExt cx="0" cy="0"/>
+        </a:xfrm>
+      </p:grpSpPr>
+      <p:sp>
+        <p:nvSpPr>
+          <p:cNvPr id="2" name="Slide Image Placeholder 1"/>
+          <p:cNvSpPr>
+            <a:spLocks noChangeAspect="1" noGrp="1" noRot="1"/>
+          </p:cNvSpPr>
+          <p:nvPr>
+            <p:ph type="sldImg"/>
+          </p:nvPr>
+        </p:nvSpPr>
+        <p:spPr bwMode="auto"/>
+      </p:sp>
+      <p:sp>
+        <p:nvSpPr>
+          <p:cNvPr id="3" name="Notes Placeholder 2"/>
+          <p:cNvSpPr>
+            <a:spLocks noGrp="1"/>
+          </p:cNvSpPr>
+          <p:nvPr>
+            <p:ph type="body" idx="1"/>
+          </p:nvPr>
+        </p:nvSpPr>
+        <p:spPr bwMode="auto"/>
+        <p:txBody>
+          <a:bodyPr/>
+          <a:lstStyle/>
+          <a:p>
+            <a:pPr>
+              <a:defRPr/>
+            </a:pPr>
+            <a:endParaRPr/>
+          </a:p>
+        </p:txBody>
+      </p:sp>
+      <p:sp>
+        <p:nvSpPr>
+          <p:cNvPr id="4" name="Slide Number Placeholder 3"/>
+          <p:cNvSpPr>
+            <a:spLocks noGrp="1"/>
+          </p:cNvSpPr>
+          <p:nvPr>
+            <p:ph type="sldNum" sz="quarter" idx="10"/>
+          </p:nvPr>
+        </p:nvSpPr>
+        <p:spPr bwMode="auto"/>
+        <p:txBody>
+          <a:bodyPr/>
+          <a:lstStyle/>
+          <a:p>
+            <a:pPr>
+              <a:defRPr/>
+            </a:pPr>
+            <a:fld id="{6AD925FD-4724-C512-285E-E8926BBEB751}" type="slidenum">
+              <a:rPr/>
+              <a:t/>
+            </a:fld>
+            <a:endParaRPr/>
+          </a:p>
+        </p:txBody>
+      </p:sp>
+    </p:spTree>
+  </p:cSld>
+</p:notes>
 </file>
 
 <file path=ppt/slideLayouts/slideLayout1.xml><?xml version="1.0" encoding="utf-8"?>
@@ -10549,7 +11036,7 @@
     <a:masterClrMapping/>
   </p:clrMapOvr>
   <mc:AlternateContent xmlns:mc="http://schemas.openxmlformats.org/markup-compatibility/2006">
-    <mc:Choice xmlns:p14="http://schemas.microsoft.com/office/powerpoint/2010/main" Requires="p14">
+    <mc:Choice xmlns:p159="http://schemas.microsoft.com/office/powerpoint/2015/09/main" xmlns:p14="http://schemas.microsoft.com/office/powerpoint/2010/main" Requires="p159">
       <p:transition p14:dur="2000" advClick="1"/>
     </mc:Choice>
     <mc:Fallback>
@@ -11215,12 +11702,15 @@
                 <a:ea typeface="Arial"/>
                 <a:cs typeface="Arial"/>
               </a:rPr>
-              <a:t>componentCode</a:t>
+              <a:t>componentCode [1..1]</a:t>
             </a:r>
-            <a:endParaRPr sz="1100">
+            <a:endParaRPr lang="en-US" sz="1100" b="0" i="0" u="none" strike="noStrike" cap="none">
               <a:solidFill>
                 <a:schemeClr val="dk1"/>
               </a:solidFill>
+              <a:latin typeface="Arial"/>
+              <a:ea typeface="Arial"/>
+              <a:cs typeface="Arial"/>
             </a:endParaRPr>
           </a:p>
           <a:p>
@@ -11248,8 +11738,27 @@
                 <a:ea typeface="Arial"/>
                 <a:cs typeface="Arial"/>
               </a:rPr>
-              <a:t>rdfs:label</a:t>
+              <a:t>rdfs:label [1..*]</a:t>
             </a:r>
+            <a:endParaRPr lang="en-US" sz="1100" b="0" i="0" u="none" strike="noStrike" cap="none">
+              <a:solidFill>
+                <a:schemeClr val="dk1"/>
+              </a:solidFill>
+              <a:latin typeface="Arial"/>
+              <a:ea typeface="Arial"/>
+              <a:cs typeface="Arial"/>
+            </a:endParaRPr>
+          </a:p>
+          <a:p>
+            <a:pPr lvl="0" algn="l">
+              <a:spcBef>
+                <a:spcPts val="0"/>
+              </a:spcBef>
+              <a:spcAft>
+                <a:spcPts val="0"/>
+              </a:spcAft>
+              <a:defRPr/>
+            </a:pPr>
             <a:endParaRPr sz="1100" b="0" i="0" u="none" strike="noStrike" cap="none">
               <a:solidFill>
                 <a:schemeClr val="dk1"/>
@@ -11658,6 +12167,38 @@
               </a:rPr>
               <a:t>ErrorCode</a:t>
             </a:r>
+            <a:endParaRPr lang="en-US" sz="1800" b="0" i="0" u="none" strike="noStrike" cap="none">
+              <a:solidFill>
+                <a:schemeClr val="dk1"/>
+              </a:solidFill>
+              <a:latin typeface="Arial"/>
+              <a:ea typeface="Arial"/>
+              <a:cs typeface="Arial"/>
+            </a:endParaRPr>
+          </a:p>
+          <a:p>
+            <a:pPr marL="206778" marR="0" lvl="0" indent="-206778" algn="l">
+              <a:spcBef>
+                <a:spcPts val="0"/>
+              </a:spcBef>
+              <a:spcAft>
+                <a:spcPts val="0"/>
+              </a:spcAft>
+              <a:buFont typeface="Arial"/>
+              <a:buChar char="•"/>
+              <a:defRPr/>
+            </a:pPr>
+            <a:r>
+              <a:rPr lang="en-US" sz="1100" b="0" i="0" u="none" strike="noStrike" cap="none" spc="0">
+                <a:solidFill>
+                  <a:srgbClr val="000000"/>
+                </a:solidFill>
+                <a:latin typeface="Arial"/>
+                <a:ea typeface="Arial"/>
+                <a:cs typeface="Arial"/>
+              </a:rPr>
+              <a:t>errorCode [1..1]</a:t>
+            </a:r>
             <a:endParaRPr sz="1800" b="0" i="0" u="none" strike="noStrike" cap="none">
               <a:solidFill>
                 <a:schemeClr val="dk1"/>
@@ -12160,7 +12701,7 @@
         <p:spPr bwMode="auto">
           <a:xfrm flipH="0" flipV="0">
             <a:off x="5384522" y="5886146"/>
-            <a:ext cx="1743738" cy="457519"/>
+            <a:ext cx="1743738" cy="457518"/>
           </a:xfrm>
           <a:prstGeom prst="rect">
             <a:avLst/>
@@ -12173,7 +12714,7 @@
           </a:ln>
         </p:spPr>
         <p:txBody>
-          <a:bodyPr spcFirstLastPara="1" wrap="square" lIns="91424" tIns="45699" rIns="91424" bIns="45699" anchor="t" anchorCtr="0">
+          <a:bodyPr spcFirstLastPara="1" wrap="square" lIns="91423" tIns="45699" rIns="91423" bIns="45699" anchor="t" anchorCtr="0">
             <a:spAutoFit/>
           </a:bodyPr>
           <a:lstStyle/>
@@ -12216,7 +12757,7 @@
     <a:masterClrMapping/>
   </p:clrMapOvr>
   <mc:AlternateContent xmlns:mc="http://schemas.openxmlformats.org/markup-compatibility/2006">
-    <mc:Choice xmlns:p14="http://schemas.microsoft.com/office/powerpoint/2010/main" Requires="p14">
+    <mc:Choice xmlns:p159="http://schemas.microsoft.com/office/powerpoint/2015/09/main" xmlns:p14="http://schemas.microsoft.com/office/powerpoint/2010/main" Requires="p159">
       <p:transition p14:dur="2000" advClick="1"/>
     </mc:Choice>
     <mc:Fallback>
@@ -12429,4 +12970,209 @@
   </a:themeElements>
   <a:objectDefaults/>
 </a:theme>
+</file>
+
+<file path=ppt/theme/theme2.xml><?xml version="1.0" encoding="utf-8"?>
+<a:theme xmlns:a="http://schemas.openxmlformats.org/drawingml/2006/main" xmlns:r="http://schemas.openxmlformats.org/officeDocument/2006/relationships" xmlns:p="http://schemas.openxmlformats.org/presentationml/2006/main" name="Office Theme">
+  <a:themeElements>
+    <a:clrScheme name="New Office">
+      <a:dk1>
+        <a:srgbClr val="000000"/>
+      </a:dk1>
+      <a:lt1>
+        <a:srgbClr val="FFFFFF"/>
+      </a:lt1>
+      <a:dk2>
+        <a:srgbClr val="44546A"/>
+      </a:dk2>
+      <a:lt2>
+        <a:srgbClr val="E7E6E6"/>
+      </a:lt2>
+      <a:accent1>
+        <a:srgbClr val="5B9BD5"/>
+      </a:accent1>
+      <a:accent2>
+        <a:srgbClr val="ED7D31"/>
+      </a:accent2>
+      <a:accent3>
+        <a:srgbClr val="A5A5A5"/>
+      </a:accent3>
+      <a:accent4>
+        <a:srgbClr val="FFC000"/>
+      </a:accent4>
+      <a:accent5>
+        <a:srgbClr val="4472C4"/>
+      </a:accent5>
+      <a:accent6>
+        <a:srgbClr val="70AD47"/>
+      </a:accent6>
+      <a:hlink>
+        <a:srgbClr val="0563C1"/>
+      </a:hlink>
+      <a:folHlink>
+        <a:srgbClr val="954F72"/>
+      </a:folHlink>
+    </a:clrScheme>
+    <a:fontScheme name="">
+      <a:majorFont>
+        <a:latin typeface="Arial"/>
+        <a:ea typeface="Arial"/>
+        <a:cs typeface="Arial"/>
+      </a:majorFont>
+      <a:minorFont>
+        <a:latin typeface="Arial"/>
+        <a:ea typeface="Arial"/>
+        <a:cs typeface="Arial"/>
+      </a:minorFont>
+    </a:fontScheme>
+    <a:fmtScheme name="Office">
+      <a:fillStyleLst>
+        <a:solidFill>
+          <a:schemeClr val="phClr"/>
+        </a:solidFill>
+        <a:gradFill>
+          <a:gsLst>
+            <a:gs pos="0">
+              <a:schemeClr val="phClr">
+                <a:tint val="50000"/>
+                <a:satMod val="300000"/>
+              </a:schemeClr>
+            </a:gs>
+            <a:gs pos="35000">
+              <a:schemeClr val="phClr">
+                <a:tint val="37000"/>
+                <a:satMod val="300000"/>
+              </a:schemeClr>
+            </a:gs>
+            <a:gs pos="100000">
+              <a:schemeClr val="phClr">
+                <a:tint val="15000"/>
+                <a:satMod val="350000"/>
+              </a:schemeClr>
+            </a:gs>
+          </a:gsLst>
+          <a:lin ang="16200000" scaled="1"/>
+        </a:gradFill>
+        <a:gradFill>
+          <a:gsLst>
+            <a:gs pos="0">
+              <a:schemeClr val="phClr">
+                <a:tint val="100000"/>
+                <a:shade val="100000"/>
+                <a:satMod val="130000"/>
+              </a:schemeClr>
+            </a:gs>
+            <a:gs pos="100000">
+              <a:schemeClr val="phClr">
+                <a:tint val="50000"/>
+                <a:shade val="100000"/>
+                <a:satMod val="350000"/>
+              </a:schemeClr>
+            </a:gs>
+          </a:gsLst>
+          <a:lin ang="16200000" scaled="0"/>
+        </a:gradFill>
+      </a:fillStyleLst>
+      <a:lnStyleLst>
+        <a:ln w="9525" cap="flat" cmpd="sng" algn="ctr">
+          <a:solidFill>
+            <a:schemeClr val="phClr">
+              <a:shade val="95000"/>
+              <a:satMod val="105000"/>
+            </a:schemeClr>
+          </a:solidFill>
+          <a:prstDash val="solid"/>
+        </a:ln>
+        <a:ln w="25400" cap="flat" cmpd="sng" algn="ctr">
+          <a:solidFill>
+            <a:schemeClr val="phClr"/>
+          </a:solidFill>
+          <a:prstDash val="solid"/>
+        </a:ln>
+        <a:ln w="38100" cap="flat" cmpd="sng" algn="ctr">
+          <a:solidFill>
+            <a:schemeClr val="phClr"/>
+          </a:solidFill>
+          <a:prstDash val="solid"/>
+        </a:ln>
+      </a:lnStyleLst>
+      <a:effectStyleLst>
+        <a:effectStyle>
+          <a:effectLst>
+            <a:outerShdw blurRad="40000" dist="20000" dir="5400000" rotWithShape="0">
+              <a:srgbClr val="000000">
+                <a:alpha val="38000"/>
+              </a:srgbClr>
+            </a:outerShdw>
+          </a:effectLst>
+        </a:effectStyle>
+        <a:effectStyle>
+          <a:effectLst>
+            <a:outerShdw blurRad="40000" dist="23000" dir="5400000" rotWithShape="0">
+              <a:srgbClr val="000000">
+                <a:alpha val="35000"/>
+              </a:srgbClr>
+            </a:outerShdw>
+          </a:effectLst>
+        </a:effectStyle>
+        <a:effectStyle>
+          <a:effectLst>
+            <a:outerShdw blurRad="40000" dist="23000" dir="5400000" rotWithShape="0">
+              <a:srgbClr val="000000">
+                <a:alpha val="35000"/>
+              </a:srgbClr>
+            </a:outerShdw>
+          </a:effectLst>
+        </a:effectStyle>
+      </a:effectStyleLst>
+      <a:bgFillStyleLst>
+        <a:solidFill>
+          <a:schemeClr val="phClr"/>
+        </a:solidFill>
+        <a:gradFill>
+          <a:gsLst>
+            <a:gs pos="0">
+              <a:schemeClr val="phClr">
+                <a:tint val="40000"/>
+                <a:satMod val="350000"/>
+              </a:schemeClr>
+            </a:gs>
+            <a:gs pos="40000">
+              <a:schemeClr val="phClr">
+                <a:tint val="45000"/>
+                <a:shade val="99000"/>
+                <a:satMod val="350000"/>
+              </a:schemeClr>
+            </a:gs>
+            <a:gs pos="100000">
+              <a:schemeClr val="phClr">
+                <a:shade val="20000"/>
+                <a:satMod val="255000"/>
+              </a:schemeClr>
+            </a:gs>
+          </a:gsLst>
+          <a:path path="circle"/>
+        </a:gradFill>
+        <a:gradFill>
+          <a:gsLst>
+            <a:gs pos="0">
+              <a:schemeClr val="phClr">
+                <a:tint val="80000"/>
+                <a:satMod val="300000"/>
+              </a:schemeClr>
+            </a:gs>
+            <a:gs pos="100000">
+              <a:schemeClr val="phClr">
+                <a:shade val="30000"/>
+                <a:satMod val="200000"/>
+              </a:schemeClr>
+            </a:gs>
+          </a:gsLst>
+          <a:path path="circle"/>
+        </a:gradFill>
+      </a:bgFillStyleLst>
+    </a:fmtScheme>
+  </a:themeElements>
+  <a:objectDefaults/>
+</a:theme>
 </file>
</xml_diff>